<commit_message>
add feature: delete old avatar when uploading new avatar; some other changes
</commit_message>
<xml_diff>
--- a/Presentation.pptx
+++ b/Presentation.pptx
@@ -15,7 +15,8 @@
     <p:sldId id="267" r:id="rId9"/>
     <p:sldId id="264" r:id="rId10"/>
     <p:sldId id="265" r:id="rId11"/>
-    <p:sldId id="266" r:id="rId12"/>
+    <p:sldId id="268" r:id="rId12"/>
+    <p:sldId id="266" r:id="rId13"/>
   </p:sldIdLst>
   <p:sldSz cx="12192000" cy="6858000"/>
   <p:notesSz cx="6858000" cy="9144000"/>
@@ -269,7 +270,7 @@
           <a:p>
             <a:fld id="{5481C410-5F29-4607-A107-8BCDDBCBDDCA}" type="datetimeFigureOut">
               <a:rPr lang="en-US" smtClean="0"/>
-              <a:t>14-May-24</a:t>
+              <a:t>15-May-24</a:t>
             </a:fld>
             <a:endParaRPr lang="en-US"/>
           </a:p>
@@ -467,7 +468,7 @@
           <a:p>
             <a:fld id="{5481C410-5F29-4607-A107-8BCDDBCBDDCA}" type="datetimeFigureOut">
               <a:rPr lang="en-US" smtClean="0"/>
-              <a:t>14-May-24</a:t>
+              <a:t>15-May-24</a:t>
             </a:fld>
             <a:endParaRPr lang="en-US"/>
           </a:p>
@@ -675,7 +676,7 @@
           <a:p>
             <a:fld id="{5481C410-5F29-4607-A107-8BCDDBCBDDCA}" type="datetimeFigureOut">
               <a:rPr lang="en-US" smtClean="0"/>
-              <a:t>14-May-24</a:t>
+              <a:t>15-May-24</a:t>
             </a:fld>
             <a:endParaRPr lang="en-US"/>
           </a:p>
@@ -873,7 +874,7 @@
           <a:p>
             <a:fld id="{5481C410-5F29-4607-A107-8BCDDBCBDDCA}" type="datetimeFigureOut">
               <a:rPr lang="en-US" smtClean="0"/>
-              <a:t>14-May-24</a:t>
+              <a:t>15-May-24</a:t>
             </a:fld>
             <a:endParaRPr lang="en-US"/>
           </a:p>
@@ -1148,7 +1149,7 @@
           <a:p>
             <a:fld id="{5481C410-5F29-4607-A107-8BCDDBCBDDCA}" type="datetimeFigureOut">
               <a:rPr lang="en-US" smtClean="0"/>
-              <a:t>14-May-24</a:t>
+              <a:t>15-May-24</a:t>
             </a:fld>
             <a:endParaRPr lang="en-US"/>
           </a:p>
@@ -1413,7 +1414,7 @@
           <a:p>
             <a:fld id="{5481C410-5F29-4607-A107-8BCDDBCBDDCA}" type="datetimeFigureOut">
               <a:rPr lang="en-US" smtClean="0"/>
-              <a:t>14-May-24</a:t>
+              <a:t>15-May-24</a:t>
             </a:fld>
             <a:endParaRPr lang="en-US"/>
           </a:p>
@@ -1825,7 +1826,7 @@
           <a:p>
             <a:fld id="{5481C410-5F29-4607-A107-8BCDDBCBDDCA}" type="datetimeFigureOut">
               <a:rPr lang="en-US" smtClean="0"/>
-              <a:t>14-May-24</a:t>
+              <a:t>15-May-24</a:t>
             </a:fld>
             <a:endParaRPr lang="en-US"/>
           </a:p>
@@ -1966,7 +1967,7 @@
           <a:p>
             <a:fld id="{5481C410-5F29-4607-A107-8BCDDBCBDDCA}" type="datetimeFigureOut">
               <a:rPr lang="en-US" smtClean="0"/>
-              <a:t>14-May-24</a:t>
+              <a:t>15-May-24</a:t>
             </a:fld>
             <a:endParaRPr lang="en-US"/>
           </a:p>
@@ -2079,7 +2080,7 @@
           <a:p>
             <a:fld id="{5481C410-5F29-4607-A107-8BCDDBCBDDCA}" type="datetimeFigureOut">
               <a:rPr lang="en-US" smtClean="0"/>
-              <a:t>14-May-24</a:t>
+              <a:t>15-May-24</a:t>
             </a:fld>
             <a:endParaRPr lang="en-US"/>
           </a:p>
@@ -2390,7 +2391,7 @@
           <a:p>
             <a:fld id="{5481C410-5F29-4607-A107-8BCDDBCBDDCA}" type="datetimeFigureOut">
               <a:rPr lang="en-US" smtClean="0"/>
-              <a:t>14-May-24</a:t>
+              <a:t>15-May-24</a:t>
             </a:fld>
             <a:endParaRPr lang="en-US"/>
           </a:p>
@@ -2678,7 +2679,7 @@
           <a:p>
             <a:fld id="{5481C410-5F29-4607-A107-8BCDDBCBDDCA}" type="datetimeFigureOut">
               <a:rPr lang="en-US" smtClean="0"/>
-              <a:t>14-May-24</a:t>
+              <a:t>15-May-24</a:t>
             </a:fld>
             <a:endParaRPr lang="en-US"/>
           </a:p>
@@ -2919,7 +2920,7 @@
           <a:p>
             <a:fld id="{5481C410-5F29-4607-A107-8BCDDBCBDDCA}" type="datetimeFigureOut">
               <a:rPr lang="en-US" smtClean="0"/>
-              <a:t>14-May-24</a:t>
+              <a:t>15-May-24</a:t>
             </a:fld>
             <a:endParaRPr lang="en-US"/>
           </a:p>
@@ -4179,6 +4180,331 @@
       </p:sp>
       <p:sp>
         <p:nvSpPr>
+          <p:cNvPr id="14" name="TextBox 13">
+            <a:extLst>
+              <a:ext uri="{FF2B5EF4-FFF2-40B4-BE49-F238E27FC236}">
+                <a16:creationId xmlns:a16="http://schemas.microsoft.com/office/drawing/2014/main" id="{0749E072-8834-4611-A57B-39E944B737E0}"/>
+              </a:ext>
+            </a:extLst>
+          </p:cNvPr>
+          <p:cNvSpPr txBox="1"/>
+          <p:nvPr/>
+        </p:nvSpPr>
+        <p:spPr>
+          <a:xfrm>
+            <a:off x="515218" y="181960"/>
+            <a:ext cx="2844169" cy="646331"/>
+          </a:xfrm>
+          <a:prstGeom prst="rect">
+            <a:avLst/>
+          </a:prstGeom>
+          <a:noFill/>
+        </p:spPr>
+        <p:txBody>
+          <a:bodyPr wrap="square" rtlCol="0">
+            <a:spAutoFit/>
+          </a:bodyPr>
+          <a:lstStyle/>
+          <a:p>
+            <a:r>
+              <a:rPr lang="en-US" sz="3600" b="1" dirty="0">
+                <a:solidFill>
+                  <a:srgbClr val="410433"/>
+                </a:solidFill>
+              </a:rPr>
+              <a:t>4. Structure</a:t>
+            </a:r>
+          </a:p>
+        </p:txBody>
+      </p:sp>
+      <p:sp>
+        <p:nvSpPr>
+          <p:cNvPr id="20" name="TextBox 19">
+            <a:extLst>
+              <a:ext uri="{FF2B5EF4-FFF2-40B4-BE49-F238E27FC236}">
+                <a16:creationId xmlns:a16="http://schemas.microsoft.com/office/drawing/2014/main" id="{F1F48E35-1C97-4642-8262-9616BF19E4D0}"/>
+              </a:ext>
+            </a:extLst>
+          </p:cNvPr>
+          <p:cNvSpPr txBox="1"/>
+          <p:nvPr/>
+        </p:nvSpPr>
+        <p:spPr>
+          <a:xfrm>
+            <a:off x="716729" y="828291"/>
+            <a:ext cx="2814393" cy="461665"/>
+          </a:xfrm>
+          <a:prstGeom prst="rect">
+            <a:avLst/>
+          </a:prstGeom>
+          <a:noFill/>
+        </p:spPr>
+        <p:txBody>
+          <a:bodyPr wrap="square" rtlCol="0">
+            <a:spAutoFit/>
+          </a:bodyPr>
+          <a:lstStyle/>
+          <a:p>
+            <a:r>
+              <a:rPr lang="en-US" sz="2400" b="1" dirty="0">
+                <a:solidFill>
+                  <a:srgbClr val="410433"/>
+                </a:solidFill>
+              </a:rPr>
+              <a:t>Mockup</a:t>
+            </a:r>
+            <a:endParaRPr lang="en-US" sz="2800" b="1" dirty="0">
+              <a:solidFill>
+                <a:srgbClr val="410433"/>
+              </a:solidFill>
+            </a:endParaRPr>
+          </a:p>
+        </p:txBody>
+      </p:sp>
+    </p:spTree>
+    <p:extLst>
+      <p:ext uri="{BB962C8B-B14F-4D97-AF65-F5344CB8AC3E}">
+        <p14:creationId xmlns:p14="http://schemas.microsoft.com/office/powerpoint/2010/main" val="2619455729"/>
+      </p:ext>
+    </p:extLst>
+  </p:cSld>
+  <p:clrMapOvr>
+    <a:masterClrMapping/>
+  </p:clrMapOvr>
+</p:sld>
+</file>
+
+<file path=ppt/slides/slide12.xml><?xml version="1.0" encoding="utf-8"?>
+<p:sld xmlns:a="http://schemas.openxmlformats.org/drawingml/2006/main" xmlns:r="http://schemas.openxmlformats.org/officeDocument/2006/relationships" xmlns:p="http://schemas.openxmlformats.org/presentationml/2006/main">
+  <p:cSld>
+    <p:spTree>
+      <p:nvGrpSpPr>
+        <p:cNvPr id="1" name=""/>
+        <p:cNvGrpSpPr/>
+        <p:nvPr/>
+      </p:nvGrpSpPr>
+      <p:grpSpPr>
+        <a:xfrm>
+          <a:off x="0" y="0"/>
+          <a:ext cx="0" cy="0"/>
+          <a:chOff x="0" y="0"/>
+          <a:chExt cx="0" cy="0"/>
+        </a:xfrm>
+      </p:grpSpPr>
+      <p:pic>
+        <p:nvPicPr>
+          <p:cNvPr id="5" name="Picture 4">
+            <a:extLst>
+              <a:ext uri="{FF2B5EF4-FFF2-40B4-BE49-F238E27FC236}">
+                <a16:creationId xmlns:a16="http://schemas.microsoft.com/office/drawing/2014/main" id="{A385A4BE-E734-47C2-97F4-C10D6A03786F}"/>
+              </a:ext>
+            </a:extLst>
+          </p:cNvPr>
+          <p:cNvPicPr>
+            <a:picLocks noChangeAspect="1"/>
+          </p:cNvPicPr>
+          <p:nvPr/>
+        </p:nvPicPr>
+        <p:blipFill>
+          <a:blip r:embed="rId2">
+            <a:extLst>
+              <a:ext uri="{28A0092B-C50C-407E-A947-70E740481C1C}">
+                <a14:useLocalDpi xmlns:a14="http://schemas.microsoft.com/office/drawing/2010/main" val="0"/>
+              </a:ext>
+            </a:extLst>
+          </a:blip>
+          <a:stretch>
+            <a:fillRect/>
+          </a:stretch>
+        </p:blipFill>
+        <p:spPr>
+          <a:xfrm>
+            <a:off x="-92309" y="1"/>
+            <a:ext cx="12218039" cy="6857999"/>
+          </a:xfrm>
+          <a:prstGeom prst="rect">
+            <a:avLst/>
+          </a:prstGeom>
+        </p:spPr>
+      </p:pic>
+      <p:sp>
+        <p:nvSpPr>
+          <p:cNvPr id="10" name="TextBox 9">
+            <a:extLst>
+              <a:ext uri="{FF2B5EF4-FFF2-40B4-BE49-F238E27FC236}">
+                <a16:creationId xmlns:a16="http://schemas.microsoft.com/office/drawing/2014/main" id="{175E9234-846E-49A7-82B1-8A95B919E399}"/>
+              </a:ext>
+            </a:extLst>
+          </p:cNvPr>
+          <p:cNvSpPr txBox="1"/>
+          <p:nvPr/>
+        </p:nvSpPr>
+        <p:spPr>
+          <a:xfrm>
+            <a:off x="4939553" y="2689411"/>
+            <a:ext cx="546847" cy="646331"/>
+          </a:xfrm>
+          <a:prstGeom prst="rect">
+            <a:avLst/>
+          </a:prstGeom>
+          <a:noFill/>
+        </p:spPr>
+        <p:txBody>
+          <a:bodyPr wrap="square" rtlCol="0">
+            <a:spAutoFit/>
+          </a:bodyPr>
+          <a:lstStyle/>
+          <a:p>
+            <a:r>
+              <a:rPr lang="en-US" sz="3600" b="1" dirty="0">
+                <a:solidFill>
+                  <a:schemeClr val="bg1"/>
+                </a:solidFill>
+              </a:rPr>
+              <a:t>1</a:t>
+            </a:r>
+            <a:endParaRPr lang="en-US" b="1" dirty="0">
+              <a:solidFill>
+                <a:schemeClr val="bg1"/>
+              </a:solidFill>
+            </a:endParaRPr>
+          </a:p>
+        </p:txBody>
+      </p:sp>
+      <p:sp>
+        <p:nvSpPr>
+          <p:cNvPr id="11" name="TextBox 10">
+            <a:extLst>
+              <a:ext uri="{FF2B5EF4-FFF2-40B4-BE49-F238E27FC236}">
+                <a16:creationId xmlns:a16="http://schemas.microsoft.com/office/drawing/2014/main" id="{320DAAAB-BC5C-4DF3-AFB1-DF05DB846284}"/>
+              </a:ext>
+            </a:extLst>
+          </p:cNvPr>
+          <p:cNvSpPr txBox="1"/>
+          <p:nvPr/>
+        </p:nvSpPr>
+        <p:spPr>
+          <a:xfrm>
+            <a:off x="6016711" y="3788427"/>
+            <a:ext cx="546847" cy="646331"/>
+          </a:xfrm>
+          <a:prstGeom prst="rect">
+            <a:avLst/>
+          </a:prstGeom>
+          <a:noFill/>
+        </p:spPr>
+        <p:txBody>
+          <a:bodyPr wrap="square" rtlCol="0">
+            <a:spAutoFit/>
+          </a:bodyPr>
+          <a:lstStyle/>
+          <a:p>
+            <a:r>
+              <a:rPr lang="en-US" sz="3600" b="1" dirty="0">
+                <a:solidFill>
+                  <a:schemeClr val="bg1"/>
+                </a:solidFill>
+              </a:rPr>
+              <a:t>4</a:t>
+            </a:r>
+            <a:endParaRPr lang="en-US" b="1" dirty="0">
+              <a:solidFill>
+                <a:schemeClr val="bg1"/>
+              </a:solidFill>
+            </a:endParaRPr>
+          </a:p>
+        </p:txBody>
+      </p:sp>
+      <p:sp>
+        <p:nvSpPr>
+          <p:cNvPr id="12" name="TextBox 11">
+            <a:extLst>
+              <a:ext uri="{FF2B5EF4-FFF2-40B4-BE49-F238E27FC236}">
+                <a16:creationId xmlns:a16="http://schemas.microsoft.com/office/drawing/2014/main" id="{CB02647C-1B73-4C5D-8A41-65A19A09FC27}"/>
+              </a:ext>
+            </a:extLst>
+          </p:cNvPr>
+          <p:cNvSpPr txBox="1"/>
+          <p:nvPr/>
+        </p:nvSpPr>
+        <p:spPr>
+          <a:xfrm>
+            <a:off x="4939552" y="3788427"/>
+            <a:ext cx="546847" cy="646331"/>
+          </a:xfrm>
+          <a:prstGeom prst="rect">
+            <a:avLst/>
+          </a:prstGeom>
+          <a:noFill/>
+        </p:spPr>
+        <p:txBody>
+          <a:bodyPr wrap="square" rtlCol="0">
+            <a:spAutoFit/>
+          </a:bodyPr>
+          <a:lstStyle/>
+          <a:p>
+            <a:r>
+              <a:rPr lang="en-US" sz="3600" b="1" dirty="0">
+                <a:solidFill>
+                  <a:schemeClr val="bg1"/>
+                </a:solidFill>
+              </a:rPr>
+              <a:t>3</a:t>
+            </a:r>
+            <a:endParaRPr lang="en-US" b="1" dirty="0">
+              <a:solidFill>
+                <a:schemeClr val="bg1"/>
+              </a:solidFill>
+            </a:endParaRPr>
+          </a:p>
+        </p:txBody>
+      </p:sp>
+      <p:sp>
+        <p:nvSpPr>
+          <p:cNvPr id="13" name="TextBox 12">
+            <a:extLst>
+              <a:ext uri="{FF2B5EF4-FFF2-40B4-BE49-F238E27FC236}">
+                <a16:creationId xmlns:a16="http://schemas.microsoft.com/office/drawing/2014/main" id="{C4815E56-1B49-499B-8783-D19AC32286AF}"/>
+              </a:ext>
+            </a:extLst>
+          </p:cNvPr>
+          <p:cNvSpPr txBox="1"/>
+          <p:nvPr/>
+        </p:nvSpPr>
+        <p:spPr>
+          <a:xfrm>
+            <a:off x="6016711" y="2689410"/>
+            <a:ext cx="546847" cy="646331"/>
+          </a:xfrm>
+          <a:prstGeom prst="rect">
+            <a:avLst/>
+          </a:prstGeom>
+          <a:noFill/>
+        </p:spPr>
+        <p:txBody>
+          <a:bodyPr wrap="square" rtlCol="0">
+            <a:spAutoFit/>
+          </a:bodyPr>
+          <a:lstStyle/>
+          <a:p>
+            <a:r>
+              <a:rPr lang="en-US" sz="3600" b="1" dirty="0">
+                <a:solidFill>
+                  <a:schemeClr val="bg1"/>
+                </a:solidFill>
+              </a:rPr>
+              <a:t>2</a:t>
+            </a:r>
+            <a:endParaRPr lang="en-US" b="1" dirty="0">
+              <a:solidFill>
+                <a:schemeClr val="bg1"/>
+              </a:solidFill>
+            </a:endParaRPr>
+          </a:p>
+        </p:txBody>
+      </p:sp>
+      <p:sp>
+        <p:nvSpPr>
           <p:cNvPr id="2" name="TextBox 1">
             <a:extLst>
               <a:ext uri="{FF2B5EF4-FFF2-40B4-BE49-F238E27FC236}">

</xml_diff>